<commit_message>
Mise en forme diapo
</commit_message>
<xml_diff>
--- a/ressources/UF Infra.pptx
+++ b/ressources/UF Infra.pptx
@@ -112,6 +112,11 @@
       </a:defRPr>
     </a:lvl9pPr>
   </p:defaultTextStyle>
+  <p:extLst>
+    <p:ext uri="{EFAFB233-063F-42B5-8137-9DF3F51BA10A}">
+      <p15:sldGuideLst xmlns:p15="http://schemas.microsoft.com/office/powerpoint/2012/main"/>
+    </p:ext>
+  </p:extLst>
 </p:presentation>
 </file>
 
@@ -4244,7 +4249,7 @@
   <dgm:whole/>
   <dgm:extLst>
     <a:ext uri="http://schemas.microsoft.com/office/drawing/2008/diagram">
-      <dsp:dataModelExt xmlns:dsp="http://schemas.microsoft.com/office/drawing/2008/diagram" relId="rId6" minVer="http://schemas.openxmlformats.org/drawingml/2006/diagram"/>
+      <dsp:dataModelExt xmlns:dsp="http://schemas.microsoft.com/office/drawing/2008/diagram" relId="rId7" minVer="http://schemas.openxmlformats.org/drawingml/2006/diagram"/>
     </a:ext>
   </dgm:extLst>
 </dgm:dataModel>
@@ -12490,6 +12495,266 @@
           <a:bodyPr/>
           <a:lstStyle/>
           <a:p>
+            <a:pPr marL="0" marR="0" lvl="0" indent="0" algn="l" defTabSz="914400" rtl="0" eaLnBrk="1" fontAlgn="auto" latinLnBrk="0" hangingPunct="1">
+              <a:lnSpc>
+                <a:spcPct val="100000"/>
+              </a:lnSpc>
+              <a:spcBef>
+                <a:spcPts val="0"/>
+              </a:spcBef>
+              <a:spcAft>
+                <a:spcPts val="0"/>
+              </a:spcAft>
+              <a:buClrTx/>
+              <a:buSzTx/>
+              <a:buFontTx/>
+              <a:buNone/>
+              <a:tabLst/>
+              <a:defRPr/>
+            </a:pPr>
+            <a:r>
+              <a:rPr lang="fr-FR" sz="1200" b="0" kern="1200" dirty="0">
+                <a:solidFill>
+                  <a:schemeClr val="tx1"/>
+                </a:solidFill>
+                <a:effectLst/>
+                <a:latin typeface="+mn-lt"/>
+                <a:ea typeface="+mn-ea"/>
+                <a:cs typeface="+mn-cs"/>
+              </a:rPr>
+              <a:t>~/.</a:t>
+            </a:r>
+            <a:r>
+              <a:rPr lang="fr-FR" sz="1200" b="0" kern="1200" dirty="0" err="1">
+                <a:solidFill>
+                  <a:schemeClr val="tx1"/>
+                </a:solidFill>
+                <a:effectLst/>
+                <a:latin typeface="+mn-lt"/>
+                <a:ea typeface="+mn-ea"/>
+                <a:cs typeface="+mn-cs"/>
+              </a:rPr>
+              <a:t>ssh</a:t>
+            </a:r>
+            <a:r>
+              <a:rPr lang="fr-FR" sz="1200" b="0" kern="1200" dirty="0">
+                <a:solidFill>
+                  <a:schemeClr val="tx1"/>
+                </a:solidFill>
+                <a:effectLst/>
+                <a:latin typeface="+mn-lt"/>
+                <a:ea typeface="+mn-ea"/>
+                <a:cs typeface="+mn-cs"/>
+              </a:rPr>
+              <a:t>/</a:t>
+            </a:r>
+            <a:r>
+              <a:rPr lang="fr-FR" sz="1200" b="0" kern="1200" dirty="0" err="1">
+                <a:solidFill>
+                  <a:schemeClr val="tx1"/>
+                </a:solidFill>
+                <a:effectLst/>
+                <a:latin typeface="+mn-lt"/>
+                <a:ea typeface="+mn-ea"/>
+                <a:cs typeface="+mn-cs"/>
+              </a:rPr>
+              <a:t>authorized_keys</a:t>
+            </a:r>
+            <a:endParaRPr lang="fr-FR" sz="1200" b="0" kern="1200" dirty="0">
+              <a:solidFill>
+                <a:schemeClr val="tx1"/>
+              </a:solidFill>
+              <a:effectLst/>
+              <a:latin typeface="+mn-lt"/>
+              <a:ea typeface="+mn-ea"/>
+              <a:cs typeface="+mn-cs"/>
+            </a:endParaRPr>
+          </a:p>
+          <a:p>
+            <a:pPr marL="0" marR="0" lvl="0" indent="0" algn="l" defTabSz="914400" rtl="0" eaLnBrk="1" fontAlgn="auto" latinLnBrk="0" hangingPunct="1">
+              <a:lnSpc>
+                <a:spcPct val="100000"/>
+              </a:lnSpc>
+              <a:spcBef>
+                <a:spcPts val="0"/>
+              </a:spcBef>
+              <a:spcAft>
+                <a:spcPts val="0"/>
+              </a:spcAft>
+              <a:buClrTx/>
+              <a:buSzTx/>
+              <a:buFontTx/>
+              <a:buNone/>
+              <a:tabLst/>
+              <a:defRPr/>
+            </a:pPr>
+            <a:r>
+              <a:rPr lang="fr-FR" sz="1200" b="0" kern="1200" dirty="0">
+                <a:solidFill>
+                  <a:schemeClr val="tx1"/>
+                </a:solidFill>
+                <a:effectLst/>
+                <a:latin typeface="+mn-lt"/>
+                <a:ea typeface="+mn-ea"/>
+                <a:cs typeface="+mn-cs"/>
+              </a:rPr>
+              <a:t>/</a:t>
+            </a:r>
+            <a:r>
+              <a:rPr lang="fr-FR" sz="1200" b="0" kern="1200" dirty="0" err="1">
+                <a:solidFill>
+                  <a:schemeClr val="tx1"/>
+                </a:solidFill>
+                <a:effectLst/>
+                <a:latin typeface="+mn-lt"/>
+                <a:ea typeface="+mn-ea"/>
+                <a:cs typeface="+mn-cs"/>
+              </a:rPr>
+              <a:t>etc</a:t>
+            </a:r>
+            <a:r>
+              <a:rPr lang="fr-FR" sz="1200" b="0" kern="1200" dirty="0">
+                <a:solidFill>
+                  <a:schemeClr val="tx1"/>
+                </a:solidFill>
+                <a:effectLst/>
+                <a:latin typeface="+mn-lt"/>
+                <a:ea typeface="+mn-ea"/>
+                <a:cs typeface="+mn-cs"/>
+              </a:rPr>
+              <a:t>/</a:t>
+            </a:r>
+            <a:r>
+              <a:rPr lang="fr-FR" sz="1200" b="0" kern="1200" dirty="0" err="1">
+                <a:solidFill>
+                  <a:schemeClr val="tx1"/>
+                </a:solidFill>
+                <a:effectLst/>
+                <a:latin typeface="+mn-lt"/>
+                <a:ea typeface="+mn-ea"/>
+                <a:cs typeface="+mn-cs"/>
+              </a:rPr>
+              <a:t>ssh</a:t>
+            </a:r>
+            <a:r>
+              <a:rPr lang="fr-FR" sz="1200" b="0" kern="1200" dirty="0">
+                <a:solidFill>
+                  <a:schemeClr val="tx1"/>
+                </a:solidFill>
+                <a:effectLst/>
+                <a:latin typeface="+mn-lt"/>
+                <a:ea typeface="+mn-ea"/>
+                <a:cs typeface="+mn-cs"/>
+              </a:rPr>
+              <a:t>/</a:t>
+            </a:r>
+            <a:r>
+              <a:rPr lang="fr-FR" sz="1200" b="0" kern="1200" dirty="0" err="1">
+                <a:solidFill>
+                  <a:schemeClr val="tx1"/>
+                </a:solidFill>
+                <a:effectLst/>
+                <a:latin typeface="+mn-lt"/>
+                <a:ea typeface="+mn-ea"/>
+                <a:cs typeface="+mn-cs"/>
+              </a:rPr>
+              <a:t>sshd_config</a:t>
+            </a:r>
+            <a:endParaRPr lang="fr-FR" sz="1200" b="0" kern="1200" dirty="0">
+              <a:solidFill>
+                <a:schemeClr val="tx1"/>
+              </a:solidFill>
+              <a:effectLst/>
+              <a:latin typeface="+mn-lt"/>
+              <a:ea typeface="+mn-ea"/>
+              <a:cs typeface="+mn-cs"/>
+            </a:endParaRPr>
+          </a:p>
+          <a:p>
+            <a:endParaRPr lang="fr-FR" dirty="0"/>
+          </a:p>
+        </p:txBody>
+      </p:sp>
+      <p:sp>
+        <p:nvSpPr>
+          <p:cNvPr id="4" name="Espace réservé du numéro de diapositive 3"/>
+          <p:cNvSpPr>
+            <a:spLocks noGrp="1"/>
+          </p:cNvSpPr>
+          <p:nvPr>
+            <p:ph type="sldNum" sz="quarter" idx="5"/>
+          </p:nvPr>
+        </p:nvSpPr>
+        <p:spPr/>
+        <p:txBody>
+          <a:bodyPr/>
+          <a:lstStyle/>
+          <a:p>
+            <a:fld id="{1E93313C-017B-4B95-9328-00C98E17513D}" type="slidenum">
+              <a:rPr lang="fr-FR" smtClean="0"/>
+              <a:t>3</a:t>
+            </a:fld>
+            <a:endParaRPr lang="fr-FR"/>
+          </a:p>
+        </p:txBody>
+      </p:sp>
+    </p:spTree>
+    <p:extLst>
+      <p:ext uri="{BB962C8B-B14F-4D97-AF65-F5344CB8AC3E}">
+        <p14:creationId xmlns:p14="http://schemas.microsoft.com/office/powerpoint/2010/main" val="813548811"/>
+      </p:ext>
+    </p:extLst>
+  </p:cSld>
+  <p:clrMapOvr>
+    <a:masterClrMapping/>
+  </p:clrMapOvr>
+</p:notes>
+</file>
+
+<file path=ppt/notesSlides/notesSlide2.xml><?xml version="1.0" encoding="utf-8"?>
+<p:notes xmlns:a="http://schemas.openxmlformats.org/drawingml/2006/main" xmlns:r="http://schemas.openxmlformats.org/officeDocument/2006/relationships" xmlns:p="http://schemas.openxmlformats.org/presentationml/2006/main">
+  <p:cSld>
+    <p:spTree>
+      <p:nvGrpSpPr>
+        <p:cNvPr id="1" name=""/>
+        <p:cNvGrpSpPr/>
+        <p:nvPr/>
+      </p:nvGrpSpPr>
+      <p:grpSpPr>
+        <a:xfrm>
+          <a:off x="0" y="0"/>
+          <a:ext cx="0" cy="0"/>
+          <a:chOff x="0" y="0"/>
+          <a:chExt cx="0" cy="0"/>
+        </a:xfrm>
+      </p:grpSpPr>
+      <p:sp>
+        <p:nvSpPr>
+          <p:cNvPr id="2" name="Espace réservé de l'image des diapositives 1"/>
+          <p:cNvSpPr>
+            <a:spLocks noGrp="1" noRot="1" noChangeAspect="1"/>
+          </p:cNvSpPr>
+          <p:nvPr>
+            <p:ph type="sldImg"/>
+          </p:nvPr>
+        </p:nvSpPr>
+        <p:spPr/>
+      </p:sp>
+      <p:sp>
+        <p:nvSpPr>
+          <p:cNvPr id="3" name="Espace réservé des notes 2"/>
+          <p:cNvSpPr>
+            <a:spLocks noGrp="1"/>
+          </p:cNvSpPr>
+          <p:nvPr>
+            <p:ph type="body" idx="1"/>
+          </p:nvPr>
+        </p:nvSpPr>
+        <p:spPr/>
+        <p:txBody>
+          <a:bodyPr/>
+          <a:lstStyle/>
+          <a:p>
             <a:r>
               <a:rPr lang="fr-FR" dirty="0" err="1"/>
               <a:t>sudo</a:t>
@@ -12650,7 +12915,7 @@
               </a:rPr>
               <a:t>sshd</a:t>
             </a:r>
-            <a:endParaRPr lang="fr-FR" sz="1200" b="0" kern="1200">
+            <a:endParaRPr lang="fr-FR" sz="1200" b="0" kern="1200" dirty="0">
               <a:solidFill>
                 <a:schemeClr val="tx1"/>
               </a:solidFill>
@@ -12678,7 +12943,7 @@
               <a:tabLst/>
               <a:defRPr/>
             </a:pPr>
-            <a:endParaRPr lang="fr-FR" sz="1200" b="0" kern="1200">
+            <a:endParaRPr lang="fr-FR" sz="1200" b="0" kern="1200" dirty="0">
               <a:solidFill>
                 <a:schemeClr val="tx1"/>
               </a:solidFill>
@@ -12729,7 +12994,7 @@
 </p:notes>
 </file>
 
-<file path=ppt/notesSlides/notesSlide2.xml><?xml version="1.0" encoding="utf-8"?>
+<file path=ppt/notesSlides/notesSlide3.xml><?xml version="1.0" encoding="utf-8"?>
 <p:notes xmlns:a="http://schemas.openxmlformats.org/drawingml/2006/main" xmlns:r="http://schemas.openxmlformats.org/officeDocument/2006/relationships" xmlns:p="http://schemas.openxmlformats.org/presentationml/2006/main">
   <p:cSld>
     <p:spTree>
@@ -16131,7 +16396,7 @@
           <a:p>
             <a:pPr algn="l"/>
             <a:r>
-              <a:rPr lang="fr-FR" sz="8200">
+              <a:rPr lang="fr-FR" sz="8200" dirty="0">
                 <a:solidFill>
                   <a:schemeClr val="bg1"/>
                 </a:solidFill>
@@ -16139,19 +16404,35 @@
               <a:t>UF Infra</a:t>
             </a:r>
             <a:br>
-              <a:rPr lang="fr-FR" sz="8200">
+              <a:rPr lang="fr-FR" sz="8200" dirty="0">
                 <a:solidFill>
                   <a:schemeClr val="bg1"/>
                 </a:solidFill>
               </a:rPr>
             </a:br>
             <a:r>
-              <a:rPr lang="fr-FR" sz="8200">
+              <a:rPr lang="fr-FR" sz="8200" dirty="0">
                 <a:solidFill>
                   <a:schemeClr val="bg1"/>
                 </a:solidFill>
               </a:rPr>
-              <a:t>Docker / Drone / Gitea</a:t>
+              <a:t>Docker / </a:t>
+            </a:r>
+            <a:r>
+              <a:rPr lang="fr-FR" sz="8200" dirty="0" err="1">
+                <a:solidFill>
+                  <a:schemeClr val="bg1"/>
+                </a:solidFill>
+              </a:rPr>
+              <a:t>Gitea</a:t>
+            </a:r>
+            <a:r>
+              <a:rPr lang="fr-FR" sz="8200" dirty="0">
+                <a:solidFill>
+                  <a:schemeClr val="bg1"/>
+                </a:solidFill>
+              </a:rPr>
+              <a:t> / Drone</a:t>
             </a:r>
           </a:p>
         </p:txBody>
@@ -17079,10 +17360,33 @@
             <a:off x="8892132" y="1564414"/>
             <a:ext cx="1837266" cy="1837266"/>
           </a:xfrm>
-          <a:prstGeom prst="rect">
+          <a:prstGeom prst="ellipse">
             <a:avLst/>
           </a:prstGeom>
-          <a:noFill/>
+          <a:ln w="63500" cap="rnd">
+            <a:solidFill>
+              <a:srgbClr val="333333"/>
+            </a:solidFill>
+          </a:ln>
+          <a:effectLst>
+            <a:outerShdw blurRad="381000" dist="292100" dir="5400000" sx="-80000" sy="-18000" rotWithShape="0">
+              <a:srgbClr val="000000">
+                <a:alpha val="22000"/>
+              </a:srgbClr>
+            </a:outerShdw>
+          </a:effectLst>
+          <a:scene3d>
+            <a:camera prst="orthographicFront"/>
+            <a:lightRig rig="contrasting" dir="t">
+              <a:rot lat="0" lon="0" rev="3000000"/>
+            </a:lightRig>
+          </a:scene3d>
+          <a:sp3d contourW="7620">
+            <a:bevelT w="95250" h="31750"/>
+            <a:contourClr>
+              <a:srgbClr val="333333"/>
+            </a:contourClr>
+          </a:sp3d>
           <a:extLst>
             <a:ext uri="{909E8E84-426E-40DD-AFC4-6F175D3DCCD1}">
               <a14:hiddenFill xmlns:a14="http://schemas.microsoft.com/office/drawing/2010/main">
@@ -17302,7 +17606,7 @@
         </p:xfrm>
         <a:graphic>
           <a:graphicData uri="http://schemas.openxmlformats.org/drawingml/2006/diagram">
-            <dgm:relIds xmlns:dgm="http://schemas.openxmlformats.org/drawingml/2006/diagram" xmlns:r="http://schemas.openxmlformats.org/officeDocument/2006/relationships" r:dm="rId2" r:lo="rId3" r:qs="rId4" r:cs="rId5"/>
+            <dgm:relIds xmlns:dgm="http://schemas.openxmlformats.org/drawingml/2006/diagram" xmlns:r="http://schemas.openxmlformats.org/officeDocument/2006/relationships" r:dm="rId3" r:lo="rId4" r:qs="rId5" r:cs="rId6"/>
           </a:graphicData>
         </a:graphic>
       </p:graphicFrame>

</xml_diff>